<commit_message>
Fixed spape export scale.
</commit_message>
<xml_diff>
--- a/test/testppt.pptx
+++ b/test/testppt.pptx
@@ -6,6 +6,7 @@
   </p:sldMasterIdLst>
   <p:sldIdLst>
     <p:sldId id="256" r:id="rId2"/>
+    <p:sldId id="257" r:id="rId3"/>
   </p:sldIdLst>
   <p:sldSz cx="9144000" cy="6858000" type="screen4x3"/>
   <p:notesSz cx="6858000" cy="9144000"/>
@@ -288,7 +289,7 @@
           <a:p>
             <a:fld id="{63271EFF-DC2E-4E35-93F8-F4CE3E029244}" type="datetimeFigureOut">
               <a:rPr kumimoji="1" lang="ja-JP" altLang="en-US" smtClean="0"/>
-              <a:t>2013/3/17</a:t>
+              <a:t>2013/3/27</a:t>
             </a:fld>
             <a:endParaRPr kumimoji="1" lang="ja-JP" altLang="en-US"/>
           </a:p>
@@ -490,7 +491,7 @@
           <a:p>
             <a:fld id="{63271EFF-DC2E-4E35-93F8-F4CE3E029244}" type="datetimeFigureOut">
               <a:rPr kumimoji="1" lang="ja-JP" altLang="en-US" smtClean="0"/>
-              <a:t>2013/3/17</a:t>
+              <a:t>2013/3/27</a:t>
             </a:fld>
             <a:endParaRPr kumimoji="1" lang="ja-JP" altLang="en-US"/>
           </a:p>
@@ -702,7 +703,7 @@
           <a:p>
             <a:fld id="{63271EFF-DC2E-4E35-93F8-F4CE3E029244}" type="datetimeFigureOut">
               <a:rPr kumimoji="1" lang="ja-JP" altLang="en-US" smtClean="0"/>
-              <a:t>2013/3/17</a:t>
+              <a:t>2013/3/27</a:t>
             </a:fld>
             <a:endParaRPr kumimoji="1" lang="ja-JP" altLang="en-US"/>
           </a:p>
@@ -904,7 +905,7 @@
           <a:p>
             <a:fld id="{63271EFF-DC2E-4E35-93F8-F4CE3E029244}" type="datetimeFigureOut">
               <a:rPr kumimoji="1" lang="ja-JP" altLang="en-US" smtClean="0"/>
-              <a:t>2013/3/17</a:t>
+              <a:t>2013/3/27</a:t>
             </a:fld>
             <a:endParaRPr kumimoji="1" lang="ja-JP" altLang="en-US"/>
           </a:p>
@@ -1150,7 +1151,7 @@
           <a:p>
             <a:fld id="{63271EFF-DC2E-4E35-93F8-F4CE3E029244}" type="datetimeFigureOut">
               <a:rPr kumimoji="1" lang="ja-JP" altLang="en-US" smtClean="0"/>
-              <a:t>2013/3/17</a:t>
+              <a:t>2013/3/27</a:t>
             </a:fld>
             <a:endParaRPr kumimoji="1" lang="ja-JP" altLang="en-US"/>
           </a:p>
@@ -1502,7 +1503,7 @@
           <a:p>
             <a:fld id="{63271EFF-DC2E-4E35-93F8-F4CE3E029244}" type="datetimeFigureOut">
               <a:rPr kumimoji="1" lang="ja-JP" altLang="en-US" smtClean="0"/>
-              <a:t>2013/3/17</a:t>
+              <a:t>2013/3/27</a:t>
             </a:fld>
             <a:endParaRPr kumimoji="1" lang="ja-JP" altLang="en-US"/>
           </a:p>
@@ -1988,7 +1989,7 @@
           <a:p>
             <a:fld id="{63271EFF-DC2E-4E35-93F8-F4CE3E029244}" type="datetimeFigureOut">
               <a:rPr kumimoji="1" lang="ja-JP" altLang="en-US" smtClean="0"/>
-              <a:t>2013/3/17</a:t>
+              <a:t>2013/3/27</a:t>
             </a:fld>
             <a:endParaRPr kumimoji="1" lang="ja-JP" altLang="en-US"/>
           </a:p>
@@ -2106,7 +2107,7 @@
           <a:p>
             <a:fld id="{63271EFF-DC2E-4E35-93F8-F4CE3E029244}" type="datetimeFigureOut">
               <a:rPr kumimoji="1" lang="ja-JP" altLang="en-US" smtClean="0"/>
-              <a:t>2013/3/17</a:t>
+              <a:t>2013/3/27</a:t>
             </a:fld>
             <a:endParaRPr kumimoji="1" lang="ja-JP" altLang="en-US"/>
           </a:p>
@@ -2201,7 +2202,7 @@
           <a:p>
             <a:fld id="{63271EFF-DC2E-4E35-93F8-F4CE3E029244}" type="datetimeFigureOut">
               <a:rPr kumimoji="1" lang="ja-JP" altLang="en-US" smtClean="0"/>
-              <a:t>2013/3/17</a:t>
+              <a:t>2013/3/27</a:t>
             </a:fld>
             <a:endParaRPr kumimoji="1" lang="ja-JP" altLang="en-US"/>
           </a:p>
@@ -2510,7 +2511,7 @@
           <a:p>
             <a:fld id="{63271EFF-DC2E-4E35-93F8-F4CE3E029244}" type="datetimeFigureOut">
               <a:rPr kumimoji="1" lang="ja-JP" altLang="en-US" smtClean="0"/>
-              <a:t>2013/3/17</a:t>
+              <a:t>2013/3/27</a:t>
             </a:fld>
             <a:endParaRPr kumimoji="1" lang="ja-JP" altLang="en-US"/>
           </a:p>
@@ -2763,7 +2764,7 @@
           <a:p>
             <a:fld id="{63271EFF-DC2E-4E35-93F8-F4CE3E029244}" type="datetimeFigureOut">
               <a:rPr kumimoji="1" lang="ja-JP" altLang="en-US" smtClean="0"/>
-              <a:t>2013/3/17</a:t>
+              <a:t>2013/3/27</a:t>
             </a:fld>
             <a:endParaRPr kumimoji="1" lang="ja-JP" altLang="en-US"/>
           </a:p>
@@ -3008,7 +3009,7 @@
           <a:p>
             <a:fld id="{63271EFF-DC2E-4E35-93F8-F4CE3E029244}" type="datetimeFigureOut">
               <a:rPr kumimoji="1" lang="ja-JP" altLang="en-US" smtClean="0"/>
-              <a:t>2013/3/17</a:t>
+              <a:t>2013/3/27</a:t>
             </a:fld>
             <a:endParaRPr kumimoji="1" lang="ja-JP" altLang="en-US"/>
           </a:p>
@@ -3491,6 +3492,279 @@
 </p:sld>
 </file>
 
+<file path=ppt/slides/slide2.xml><?xml version="1.0" encoding="utf-8"?>
+<p:sld xmlns:a="http://schemas.openxmlformats.org/drawingml/2006/main" xmlns:r="http://schemas.openxmlformats.org/officeDocument/2006/relationships" xmlns:p="http://schemas.openxmlformats.org/presentationml/2006/main">
+  <p:cSld>
+    <p:spTree>
+      <p:nvGrpSpPr>
+        <p:cNvPr id="1" name=""/>
+        <p:cNvGrpSpPr/>
+        <p:nvPr/>
+      </p:nvGrpSpPr>
+      <p:grpSpPr>
+        <a:xfrm>
+          <a:off x="0" y="0"/>
+          <a:ext cx="0" cy="0"/>
+          <a:chOff x="0" y="0"/>
+          <a:chExt cx="0" cy="0"/>
+        </a:xfrm>
+      </p:grpSpPr>
+      <p:grpSp>
+        <p:nvGrpSpPr>
+          <p:cNvPr id="5" name="グループ化 4" title="assign_list"/>
+          <p:cNvGrpSpPr/>
+          <p:nvPr/>
+        </p:nvGrpSpPr>
+        <p:grpSpPr>
+          <a:xfrm>
+            <a:off x="-16043" y="382434"/>
+            <a:ext cx="4011979" cy="1427748"/>
+            <a:chOff x="-16043" y="382434"/>
+            <a:chExt cx="4011979" cy="1427748"/>
+          </a:xfrm>
+        </p:grpSpPr>
+        <p:sp>
+          <p:nvSpPr>
+            <p:cNvPr id="6" name="正方形/長方形 5"/>
+            <p:cNvSpPr/>
+            <p:nvPr/>
+          </p:nvSpPr>
+          <p:spPr>
+            <a:xfrm>
+              <a:off x="2267744" y="382434"/>
+              <a:ext cx="576064" cy="914400"/>
+            </a:xfrm>
+            <a:prstGeom prst="rect">
+              <a:avLst/>
+            </a:prstGeom>
+          </p:spPr>
+          <p:style>
+            <a:lnRef idx="2">
+              <a:schemeClr val="accent1">
+                <a:shade val="50000"/>
+              </a:schemeClr>
+            </a:lnRef>
+            <a:fillRef idx="1">
+              <a:schemeClr val="accent1"/>
+            </a:fillRef>
+            <a:effectRef idx="0">
+              <a:schemeClr val="accent1"/>
+            </a:effectRef>
+            <a:fontRef idx="minor">
+              <a:schemeClr val="lt1"/>
+            </a:fontRef>
+          </p:style>
+          <p:txBody>
+            <a:bodyPr rtlCol="0" anchor="ctr"/>
+            <a:lstStyle/>
+            <a:p>
+              <a:pPr algn="ctr"/>
+              <a:r>
+                <a:rPr kumimoji="1" lang="en-US" altLang="ja-JP" sz="2800" dirty="0" smtClean="0"/>
+                <a:t>1</a:t>
+              </a:r>
+              <a:endParaRPr kumimoji="1" lang="ja-JP" altLang="en-US" sz="2800" dirty="0"/>
+            </a:p>
+          </p:txBody>
+        </p:sp>
+        <p:sp>
+          <p:nvSpPr>
+            <p:cNvPr id="7" name="正方形/長方形 6"/>
+            <p:cNvSpPr/>
+            <p:nvPr/>
+          </p:nvSpPr>
+          <p:spPr>
+            <a:xfrm>
+              <a:off x="2843808" y="382434"/>
+              <a:ext cx="576064" cy="914400"/>
+            </a:xfrm>
+            <a:prstGeom prst="rect">
+              <a:avLst/>
+            </a:prstGeom>
+          </p:spPr>
+          <p:style>
+            <a:lnRef idx="2">
+              <a:schemeClr val="accent1">
+                <a:shade val="50000"/>
+              </a:schemeClr>
+            </a:lnRef>
+            <a:fillRef idx="1">
+              <a:schemeClr val="accent1"/>
+            </a:fillRef>
+            <a:effectRef idx="0">
+              <a:schemeClr val="accent1"/>
+            </a:effectRef>
+            <a:fontRef idx="minor">
+              <a:schemeClr val="lt1"/>
+            </a:fontRef>
+          </p:style>
+          <p:txBody>
+            <a:bodyPr rtlCol="0" anchor="ctr"/>
+            <a:lstStyle/>
+            <a:p>
+              <a:pPr algn="ctr"/>
+              <a:r>
+                <a:rPr lang="en-US" altLang="ja-JP" sz="2800" dirty="0"/>
+                <a:t>2</a:t>
+              </a:r>
+              <a:endParaRPr lang="ja-JP" altLang="en-US" sz="2800" dirty="0"/>
+            </a:p>
+          </p:txBody>
+        </p:sp>
+        <p:sp>
+          <p:nvSpPr>
+            <p:cNvPr id="8" name="正方形/長方形 7"/>
+            <p:cNvSpPr/>
+            <p:nvPr/>
+          </p:nvSpPr>
+          <p:spPr>
+            <a:xfrm>
+              <a:off x="3419872" y="382434"/>
+              <a:ext cx="576064" cy="914400"/>
+            </a:xfrm>
+            <a:prstGeom prst="rect">
+              <a:avLst/>
+            </a:prstGeom>
+          </p:spPr>
+          <p:style>
+            <a:lnRef idx="2">
+              <a:schemeClr val="accent1">
+                <a:shade val="50000"/>
+              </a:schemeClr>
+            </a:lnRef>
+            <a:fillRef idx="1">
+              <a:schemeClr val="accent1"/>
+            </a:fillRef>
+            <a:effectRef idx="0">
+              <a:schemeClr val="accent1"/>
+            </a:effectRef>
+            <a:fontRef idx="minor">
+              <a:schemeClr val="lt1"/>
+            </a:fontRef>
+          </p:style>
+          <p:txBody>
+            <a:bodyPr rtlCol="0" anchor="ctr"/>
+            <a:lstStyle/>
+            <a:p>
+              <a:pPr algn="ctr"/>
+              <a:r>
+                <a:rPr lang="en-US" altLang="ja-JP" sz="2800" dirty="0"/>
+                <a:t>3</a:t>
+              </a:r>
+              <a:endParaRPr kumimoji="1" lang="ja-JP" altLang="en-US" sz="2800" dirty="0"/>
+            </a:p>
+          </p:txBody>
+        </p:sp>
+        <p:sp>
+          <p:nvSpPr>
+            <p:cNvPr id="9" name="テキスト ボックス 8"/>
+            <p:cNvSpPr txBox="1"/>
+            <p:nvPr/>
+          </p:nvSpPr>
+          <p:spPr>
+            <a:xfrm>
+              <a:off x="-16043" y="515471"/>
+              <a:ext cx="1103187" cy="584775"/>
+            </a:xfrm>
+            <a:prstGeom prst="rect">
+              <a:avLst/>
+            </a:prstGeom>
+            <a:noFill/>
+          </p:spPr>
+          <p:txBody>
+            <a:bodyPr wrap="none" rtlCol="0">
+              <a:spAutoFit/>
+            </a:bodyPr>
+            <a:lstStyle/>
+            <a:p>
+              <a:r>
+                <a:rPr kumimoji="1" lang="en-US" altLang="ja-JP" sz="3200" b="1" dirty="0" smtClean="0"/>
+                <a:t>spam</a:t>
+              </a:r>
+              <a:endParaRPr kumimoji="1" lang="ja-JP" altLang="en-US" sz="3200" b="1" dirty="0"/>
+            </a:p>
+          </p:txBody>
+        </p:sp>
+        <p:cxnSp>
+          <p:nvCxnSpPr>
+            <p:cNvPr id="10" name="直線矢印コネクタ 9"/>
+            <p:cNvCxnSpPr>
+              <a:stCxn id="9" idx="3"/>
+              <a:endCxn id="6" idx="1"/>
+            </p:cNvCxnSpPr>
+            <p:nvPr/>
+          </p:nvCxnSpPr>
+          <p:spPr>
+            <a:xfrm>
+              <a:off x="1087144" y="807859"/>
+              <a:ext cx="1180600" cy="31775"/>
+            </a:xfrm>
+            <a:prstGeom prst="straightConnector1">
+              <a:avLst/>
+            </a:prstGeom>
+            <a:ln>
+              <a:tailEnd type="triangle" w="lg" len="lg"/>
+            </a:ln>
+          </p:spPr>
+          <p:style>
+            <a:lnRef idx="1">
+              <a:schemeClr val="accent1"/>
+            </a:lnRef>
+            <a:fillRef idx="0">
+              <a:schemeClr val="accent1"/>
+            </a:fillRef>
+            <a:effectRef idx="0">
+              <a:schemeClr val="accent1"/>
+            </a:effectRef>
+            <a:fontRef idx="minor">
+              <a:schemeClr val="tx1"/>
+            </a:fontRef>
+          </p:style>
+        </p:cxnSp>
+        <p:sp>
+          <p:nvSpPr>
+            <p:cNvPr id="11" name="テキスト ボックス 10"/>
+            <p:cNvSpPr txBox="1"/>
+            <p:nvPr/>
+          </p:nvSpPr>
+          <p:spPr>
+            <a:xfrm>
+              <a:off x="1611872" y="1440850"/>
+              <a:ext cx="1519968" cy="369332"/>
+            </a:xfrm>
+            <a:prstGeom prst="rect">
+              <a:avLst/>
+            </a:prstGeom>
+            <a:noFill/>
+          </p:spPr>
+          <p:txBody>
+            <a:bodyPr wrap="none" rtlCol="0">
+              <a:spAutoFit/>
+            </a:bodyPr>
+            <a:lstStyle/>
+            <a:p>
+              <a:r>
+                <a:rPr lang="en-US" altLang="ja-JP" dirty="0" smtClean="0"/>
+                <a:t>spam = [1,2,3]</a:t>
+              </a:r>
+              <a:endParaRPr kumimoji="1" lang="ja-JP" altLang="en-US" dirty="0"/>
+            </a:p>
+          </p:txBody>
+        </p:sp>
+      </p:grpSp>
+    </p:spTree>
+    <p:extLst>
+      <p:ext uri="{BB962C8B-B14F-4D97-AF65-F5344CB8AC3E}">
+        <p14:creationId xmlns:p14="http://schemas.microsoft.com/office/powerpoint/2010/main" val="2976748745"/>
+      </p:ext>
+    </p:extLst>
+  </p:cSld>
+  <p:clrMapOvr>
+    <a:masterClrMapping/>
+  </p:clrMapOvr>
+</p:sld>
+</file>
+
 <file path=ppt/theme/theme1.xml><?xml version="1.0" encoding="utf-8"?>
 <a:theme xmlns:a="http://schemas.openxmlformats.org/drawingml/2006/main" name="Office ​​テーマ">
   <a:themeElements>

</xml_diff>